<commit_message>
Day 4, miiinor fix
Comment about improvement for future, and made property capitalised.
</commit_message>
<xml_diff>
--- a/Week 4 — Presentation.pptx
+++ b/Week 4 — Presentation.pptx
@@ -887,7 +887,7 @@
             </a:pPr>
             <a:r>
               <a:rPr lang="en-GB"/>
-              <a:t>Vi har i sinde, at det er en kunde-case, og at programmet, så vidt muligt, skal laves som hvis det var et rigtigt produkt til erhvervsbrug (bliver vigtigt på næste slide). </a:t>
+              <a:t>Vi er opmærksomme på, i opgaven, at det er en kunde-case, og at programmet, så vidt muligt, skal laves, som hvis det var et rigtigt produkt til erhvervsbrug (bliver vigtigt på næste slide). </a:t>
             </a:r>
             <a:endParaRPr/>
           </a:p>
@@ -1067,7 +1067,7 @@
             </a:pPr>
             <a:r>
               <a:rPr lang="en-GB"/>
-              <a:t>CloseXML, hernæst, kan bruges, og virkede endda til at være nemt at bruge. </a:t>
+              <a:t>ClosedXML, hernæst, kan bruges, og virkede endda til at være nemt at bruge. </a:t>
             </a:r>
             <a:endParaRPr/>
           </a:p>
@@ -7084,8 +7084,8 @@
         </p:blipFill>
         <p:spPr>
           <a:xfrm>
-            <a:off x="3630125" y="2903232"/>
-            <a:ext cx="3993825" cy="865329"/>
+            <a:off x="3901000" y="2903225"/>
+            <a:ext cx="3470925" cy="752050"/>
           </a:xfrm>
           <a:prstGeom prst="rect">
             <a:avLst/>

</xml_diff>